<commit_message>
updating menu in presentation
</commit_message>
<xml_diff>
--- a/createinto.pptx
+++ b/createinto.pptx
@@ -106,6 +106,11 @@
       </a:defRPr>
     </a:lvl9pPr>
   </p:defaultTextStyle>
+  <p:extLst>
+    <p:ext uri="{EFAFB233-063F-42B5-8137-9DF3F51BA10A}">
+      <p15:sldGuideLst xmlns:p15="http://schemas.microsoft.com/office/powerpoint/2012/main"/>
+    </p:ext>
+  </p:extLst>
 </p:presentation>
 </file>
 
@@ -240,7 +245,7 @@
           <a:p>
             <a:fld id="{14AC30E0-8371-994E-988E-540B28E2E4A3}" type="datetimeFigureOut">
               <a:rPr lang="en-US" smtClean="0"/>
-              <a:t>1/20/17</a:t>
+              <a:t>1/21/17</a:t>
             </a:fld>
             <a:endParaRPr lang="en-US"/>
           </a:p>
@@ -410,7 +415,7 @@
           <a:p>
             <a:fld id="{14AC30E0-8371-994E-988E-540B28E2E4A3}" type="datetimeFigureOut">
               <a:rPr lang="en-US" smtClean="0"/>
-              <a:t>1/20/17</a:t>
+              <a:t>1/21/17</a:t>
             </a:fld>
             <a:endParaRPr lang="en-US"/>
           </a:p>
@@ -590,7 +595,7 @@
           <a:p>
             <a:fld id="{14AC30E0-8371-994E-988E-540B28E2E4A3}" type="datetimeFigureOut">
               <a:rPr lang="en-US" smtClean="0"/>
-              <a:t>1/20/17</a:t>
+              <a:t>1/21/17</a:t>
             </a:fld>
             <a:endParaRPr lang="en-US"/>
           </a:p>
@@ -760,7 +765,7 @@
           <a:p>
             <a:fld id="{14AC30E0-8371-994E-988E-540B28E2E4A3}" type="datetimeFigureOut">
               <a:rPr lang="en-US" smtClean="0"/>
-              <a:t>1/20/17</a:t>
+              <a:t>1/21/17</a:t>
             </a:fld>
             <a:endParaRPr lang="en-US"/>
           </a:p>
@@ -1006,7 +1011,7 @@
           <a:p>
             <a:fld id="{14AC30E0-8371-994E-988E-540B28E2E4A3}" type="datetimeFigureOut">
               <a:rPr lang="en-US" smtClean="0"/>
-              <a:t>1/20/17</a:t>
+              <a:t>1/21/17</a:t>
             </a:fld>
             <a:endParaRPr lang="en-US"/>
           </a:p>
@@ -1238,7 +1243,7 @@
           <a:p>
             <a:fld id="{14AC30E0-8371-994E-988E-540B28E2E4A3}" type="datetimeFigureOut">
               <a:rPr lang="en-US" smtClean="0"/>
-              <a:t>1/20/17</a:t>
+              <a:t>1/21/17</a:t>
             </a:fld>
             <a:endParaRPr lang="en-US"/>
           </a:p>
@@ -1605,7 +1610,7 @@
           <a:p>
             <a:fld id="{14AC30E0-8371-994E-988E-540B28E2E4A3}" type="datetimeFigureOut">
               <a:rPr lang="en-US" smtClean="0"/>
-              <a:t>1/20/17</a:t>
+              <a:t>1/21/17</a:t>
             </a:fld>
             <a:endParaRPr lang="en-US"/>
           </a:p>
@@ -1723,7 +1728,7 @@
           <a:p>
             <a:fld id="{14AC30E0-8371-994E-988E-540B28E2E4A3}" type="datetimeFigureOut">
               <a:rPr lang="en-US" smtClean="0"/>
-              <a:t>1/20/17</a:t>
+              <a:t>1/21/17</a:t>
             </a:fld>
             <a:endParaRPr lang="en-US"/>
           </a:p>
@@ -1818,7 +1823,7 @@
           <a:p>
             <a:fld id="{14AC30E0-8371-994E-988E-540B28E2E4A3}" type="datetimeFigureOut">
               <a:rPr lang="en-US" smtClean="0"/>
-              <a:t>1/20/17</a:t>
+              <a:t>1/21/17</a:t>
             </a:fld>
             <a:endParaRPr lang="en-US"/>
           </a:p>
@@ -2095,7 +2100,7 @@
           <a:p>
             <a:fld id="{14AC30E0-8371-994E-988E-540B28E2E4A3}" type="datetimeFigureOut">
               <a:rPr lang="en-US" smtClean="0"/>
-              <a:t>1/20/17</a:t>
+              <a:t>1/21/17</a:t>
             </a:fld>
             <a:endParaRPr lang="en-US"/>
           </a:p>
@@ -2348,7 +2353,7 @@
           <a:p>
             <a:fld id="{14AC30E0-8371-994E-988E-540B28E2E4A3}" type="datetimeFigureOut">
               <a:rPr lang="en-US" smtClean="0"/>
-              <a:t>1/20/17</a:t>
+              <a:t>1/21/17</a:t>
             </a:fld>
             <a:endParaRPr lang="en-US"/>
           </a:p>
@@ -2564,7 +2569,7 @@
           <a:p>
             <a:fld id="{14AC30E0-8371-994E-988E-540B28E2E4A3}" type="datetimeFigureOut">
               <a:rPr lang="en-US" smtClean="0"/>
-              <a:t>1/20/17</a:t>
+              <a:t>1/21/17</a:t>
             </a:fld>
             <a:endParaRPr lang="en-US"/>
           </a:p>
@@ -3160,105 +3165,120 @@
           </a:p>
         </p:txBody>
       </p:sp>
-      <p:pic>
-        <p:nvPicPr>
-          <p:cNvPr id="2" name="Picture 1"/>
-          <p:cNvPicPr>
-            <a:picLocks noChangeAspect="1"/>
-          </p:cNvPicPr>
+      <p:grpSp>
+        <p:nvGrpSpPr>
+          <p:cNvPr id="4" name="Group 3"/>
+          <p:cNvGrpSpPr/>
           <p:nvPr/>
-        </p:nvPicPr>
-        <p:blipFill>
-          <a:blip r:embed="rId2">
-            <a:alphaModFix amt="50000"/>
-            <a:extLst>
-              <a:ext uri="{28A0092B-C50C-407E-A947-70E740481C1C}">
-                <a14:useLocalDpi xmlns:a14="http://schemas.microsoft.com/office/drawing/2010/main" val="0"/>
-              </a:ext>
-            </a:extLst>
-          </a:blip>
-          <a:stretch>
-            <a:fillRect/>
-          </a:stretch>
-        </p:blipFill>
-        <p:spPr>
+        </p:nvGrpSpPr>
+        <p:grpSpPr>
           <a:xfrm>
             <a:off x="0" y="0"/>
             <a:ext cx="12198024" cy="6858000"/>
+            <a:chOff x="0" y="0"/>
+            <a:chExt cx="12198024" cy="6858000"/>
           </a:xfrm>
-          <a:prstGeom prst="rect">
-            <a:avLst/>
-          </a:prstGeom>
-        </p:spPr>
-      </p:pic>
-      <p:sp>
-        <p:nvSpPr>
-          <p:cNvPr id="5" name="TextBox 4"/>
-          <p:cNvSpPr txBox="1"/>
-          <p:nvPr/>
-        </p:nvSpPr>
-        <p:spPr>
-          <a:xfrm>
-            <a:off x="1440000" y="5245200"/>
-            <a:ext cx="6244082" cy="892552"/>
-          </a:xfrm>
-          <a:prstGeom prst="rect">
-            <a:avLst/>
-          </a:prstGeom>
-          <a:noFill/>
-        </p:spPr>
-        <p:txBody>
-          <a:bodyPr wrap="none" rtlCol="0">
-            <a:spAutoFit/>
-          </a:bodyPr>
-          <a:lstStyle/>
-          <a:p>
-            <a:r>
-              <a:rPr lang="en-US" sz="3600" dirty="0" err="1">
+        </p:grpSpPr>
+        <p:pic>
+          <p:nvPicPr>
+            <p:cNvPr id="2" name="Picture 1"/>
+            <p:cNvPicPr>
+              <a:picLocks noChangeAspect="1"/>
+            </p:cNvPicPr>
+            <p:nvPr/>
+          </p:nvPicPr>
+          <p:blipFill>
+            <a:blip r:embed="rId2">
+              <a:alphaModFix amt="50000"/>
+              <a:extLst>
+                <a:ext uri="{28A0092B-C50C-407E-A947-70E740481C1C}">
+                  <a14:useLocalDpi xmlns:a14="http://schemas.microsoft.com/office/drawing/2010/main" val="0"/>
+                </a:ext>
+              </a:extLst>
+            </a:blip>
+            <a:stretch>
+              <a:fillRect/>
+            </a:stretch>
+          </p:blipFill>
+          <p:spPr>
+            <a:xfrm>
+              <a:off x="0" y="0"/>
+              <a:ext cx="12198024" cy="6858000"/>
+            </a:xfrm>
+            <a:prstGeom prst="rect">
+              <a:avLst/>
+            </a:prstGeom>
+          </p:spPr>
+        </p:pic>
+        <p:sp>
+          <p:nvSpPr>
+            <p:cNvPr id="5" name="TextBox 4"/>
+            <p:cNvSpPr txBox="1"/>
+            <p:nvPr/>
+          </p:nvSpPr>
+          <p:spPr>
+            <a:xfrm>
+              <a:off x="1440000" y="5245200"/>
+              <a:ext cx="6244082" cy="892552"/>
+            </a:xfrm>
+            <a:prstGeom prst="rect">
+              <a:avLst/>
+            </a:prstGeom>
+            <a:noFill/>
+          </p:spPr>
+          <p:txBody>
+            <a:bodyPr wrap="none" rtlCol="0">
+              <a:spAutoFit/>
+            </a:bodyPr>
+            <a:lstStyle/>
+            <a:p>
+              <a:r>
+                <a:rPr lang="en-US" sz="3600" dirty="0" err="1">
+                  <a:solidFill>
+                    <a:schemeClr val="bg1"/>
+                  </a:solidFill>
+                  <a:latin typeface="Helvetica Neue Thin" charset="0"/>
+                  <a:ea typeface="Helvetica Neue Thin" charset="0"/>
+                  <a:cs typeface="Helvetica Neue Thin" charset="0"/>
+                </a:rPr>
+                <a:t>m</a:t>
+              </a:r>
+              <a:r>
+                <a:rPr lang="en-US" sz="3600" dirty="0" err="1" smtClean="0">
+                  <a:solidFill>
+                    <a:schemeClr val="bg1"/>
+                  </a:solidFill>
+                  <a:latin typeface="Helvetica Neue Thin" charset="0"/>
+                  <a:ea typeface="Helvetica Neue Thin" charset="0"/>
+                  <a:cs typeface="Helvetica Neue Thin" charset="0"/>
+                </a:rPr>
+                <a:t>oledcule</a:t>
+              </a:r>
+              <a:endParaRPr lang="en-US" sz="3600" dirty="0" smtClean="0">
                 <a:solidFill>
                   <a:schemeClr val="bg1"/>
                 </a:solidFill>
                 <a:latin typeface="Helvetica Neue Thin" charset="0"/>
                 <a:ea typeface="Helvetica Neue Thin" charset="0"/>
                 <a:cs typeface="Helvetica Neue Thin" charset="0"/>
-              </a:rPr>
-              <a:t>m</a:t>
-            </a:r>
-            <a:r>
-              <a:rPr lang="en-US" sz="3600" dirty="0" err="1" smtClean="0">
-                <a:solidFill>
-                  <a:schemeClr val="bg1"/>
-                </a:solidFill>
-                <a:latin typeface="Helvetica Neue Thin" charset="0"/>
-                <a:ea typeface="Helvetica Neue Thin" charset="0"/>
-                <a:cs typeface="Helvetica Neue Thin" charset="0"/>
-              </a:rPr>
-              <a:t>oledcule</a:t>
-            </a:r>
-            <a:endParaRPr lang="en-US" sz="3600" dirty="0" smtClean="0">
-              <a:solidFill>
-                <a:schemeClr val="bg1"/>
-              </a:solidFill>
-              <a:latin typeface="Helvetica Neue Thin" charset="0"/>
-              <a:ea typeface="Helvetica Neue Thin" charset="0"/>
-              <a:cs typeface="Helvetica Neue Thin" charset="0"/>
-            </a:endParaRPr>
-          </a:p>
-          <a:p>
-            <a:r>
-              <a:rPr lang="en-US" sz="1600" dirty="0">
-                <a:solidFill>
-                  <a:schemeClr val="bg1"/>
-                </a:solidFill>
-                <a:latin typeface="Helvetica Neue" charset="0"/>
-                <a:ea typeface="Helvetica Neue" charset="0"/>
-                <a:cs typeface="Helvetica Neue" charset="0"/>
-              </a:rPr>
-              <a:t>your future friendly community based programmable led controller</a:t>
-            </a:r>
-          </a:p>
-        </p:txBody>
-      </p:sp>
+              </a:endParaRPr>
+            </a:p>
+            <a:p>
+              <a:r>
+                <a:rPr lang="en-US" sz="1600" dirty="0">
+                  <a:solidFill>
+                    <a:schemeClr val="bg1"/>
+                  </a:solidFill>
+                  <a:latin typeface="Helvetica Neue" charset="0"/>
+                  <a:ea typeface="Helvetica Neue" charset="0"/>
+                  <a:cs typeface="Helvetica Neue" charset="0"/>
+                </a:rPr>
+                <a:t>your future friendly community based programmable led controller</a:t>
+              </a:r>
+            </a:p>
+          </p:txBody>
+        </p:sp>
+      </p:grpSp>
     </p:spTree>
     <p:extLst>
       <p:ext uri="{BB962C8B-B14F-4D97-AF65-F5344CB8AC3E}">
@@ -3269,6 +3289,18 @@
   <p:clrMapOvr>
     <a:masterClrMapping/>
   </p:clrMapOvr>
+  <mc:AlternateContent xmlns:mc="http://schemas.openxmlformats.org/markup-compatibility/2006">
+    <mc:Choice xmlns:p14="http://schemas.microsoft.com/office/powerpoint/2010/main" Requires="p14">
+      <p:transition spd="med" p14:dur="700">
+        <p:fade/>
+      </p:transition>
+    </mc:Choice>
+    <mc:Fallback>
+      <p:transition spd="med">
+        <p:fade/>
+      </p:transition>
+    </mc:Fallback>
+  </mc:AlternateContent>
   <p:timing>
     <p:tnLst>
       <p:par>
@@ -3339,102 +3371,163 @@
           </a:p>
         </p:txBody>
       </p:sp>
-      <p:pic>
-        <p:nvPicPr>
-          <p:cNvPr id="2" name="Picture 1"/>
-          <p:cNvPicPr>
-            <a:picLocks noChangeAspect="1"/>
-          </p:cNvPicPr>
+      <p:grpSp>
+        <p:nvGrpSpPr>
+          <p:cNvPr id="11" name="Group 10"/>
+          <p:cNvGrpSpPr/>
           <p:nvPr/>
-        </p:nvPicPr>
-        <p:blipFill>
-          <a:blip r:embed="rId2">
-            <a:alphaModFix amt="50000"/>
-            <a:extLst>
-              <a:ext uri="{28A0092B-C50C-407E-A947-70E740481C1C}">
-                <a14:useLocalDpi xmlns:a14="http://schemas.microsoft.com/office/drawing/2010/main" val="0"/>
-              </a:ext>
-            </a:extLst>
-          </a:blip>
-          <a:stretch>
-            <a:fillRect/>
-          </a:stretch>
-        </p:blipFill>
-        <p:spPr>
+        </p:nvGrpSpPr>
+        <p:grpSpPr>
           <a:xfrm>
             <a:off x="0" y="0"/>
             <a:ext cx="12198024" cy="6858000"/>
+            <a:chOff x="0" y="0"/>
+            <a:chExt cx="12198024" cy="6858000"/>
           </a:xfrm>
-          <a:prstGeom prst="rect">
-            <a:avLst/>
-          </a:prstGeom>
-        </p:spPr>
-      </p:pic>
-      <p:sp>
-        <p:nvSpPr>
-          <p:cNvPr id="5" name="TextBox 4"/>
-          <p:cNvSpPr txBox="1"/>
-          <p:nvPr/>
-        </p:nvSpPr>
-        <p:spPr>
-          <a:xfrm>
-            <a:off x="1440000" y="5245200"/>
-            <a:ext cx="6244082" cy="892552"/>
-          </a:xfrm>
-          <a:prstGeom prst="rect">
-            <a:avLst/>
-          </a:prstGeom>
-          <a:noFill/>
-        </p:spPr>
-        <p:txBody>
-          <a:bodyPr wrap="none" rtlCol="0">
-            <a:spAutoFit/>
-          </a:bodyPr>
-          <a:lstStyle/>
-          <a:p>
-            <a:r>
-              <a:rPr lang="en-US" sz="3600" dirty="0" err="1">
+        </p:grpSpPr>
+        <p:pic>
+          <p:nvPicPr>
+            <p:cNvPr id="2" name="Picture 1"/>
+            <p:cNvPicPr>
+              <a:picLocks noChangeAspect="1"/>
+            </p:cNvPicPr>
+            <p:nvPr/>
+          </p:nvPicPr>
+          <p:blipFill>
+            <a:blip r:embed="rId2">
+              <a:alphaModFix amt="50000"/>
+              <a:extLst>
+                <a:ext uri="{28A0092B-C50C-407E-A947-70E740481C1C}">
+                  <a14:useLocalDpi xmlns:a14="http://schemas.microsoft.com/office/drawing/2010/main" val="0"/>
+                </a:ext>
+              </a:extLst>
+            </a:blip>
+            <a:stretch>
+              <a:fillRect/>
+            </a:stretch>
+          </p:blipFill>
+          <p:spPr>
+            <a:xfrm>
+              <a:off x="0" y="0"/>
+              <a:ext cx="12198024" cy="6858000"/>
+            </a:xfrm>
+            <a:prstGeom prst="rect">
+              <a:avLst/>
+            </a:prstGeom>
+          </p:spPr>
+        </p:pic>
+        <p:sp>
+          <p:nvSpPr>
+            <p:cNvPr id="5" name="TextBox 4"/>
+            <p:cNvSpPr txBox="1"/>
+            <p:nvPr/>
+          </p:nvSpPr>
+          <p:spPr>
+            <a:xfrm>
+              <a:off x="1440000" y="5245200"/>
+              <a:ext cx="6244082" cy="892552"/>
+            </a:xfrm>
+            <a:prstGeom prst="rect">
+              <a:avLst/>
+            </a:prstGeom>
+            <a:noFill/>
+          </p:spPr>
+          <p:txBody>
+            <a:bodyPr wrap="none" rtlCol="0">
+              <a:spAutoFit/>
+            </a:bodyPr>
+            <a:lstStyle/>
+            <a:p>
+              <a:r>
+                <a:rPr lang="en-US" sz="3600" dirty="0" err="1">
+                  <a:solidFill>
+                    <a:schemeClr val="bg1"/>
+                  </a:solidFill>
+                  <a:latin typeface="Helvetica Neue Thin" charset="0"/>
+                  <a:ea typeface="Helvetica Neue Thin" charset="0"/>
+                  <a:cs typeface="Helvetica Neue Thin" charset="0"/>
+                </a:rPr>
+                <a:t>m</a:t>
+              </a:r>
+              <a:r>
+                <a:rPr lang="en-US" sz="3600" dirty="0" err="1" smtClean="0">
+                  <a:solidFill>
+                    <a:schemeClr val="bg1"/>
+                  </a:solidFill>
+                  <a:latin typeface="Helvetica Neue Thin" charset="0"/>
+                  <a:ea typeface="Helvetica Neue Thin" charset="0"/>
+                  <a:cs typeface="Helvetica Neue Thin" charset="0"/>
+                </a:rPr>
+                <a:t>oledcule</a:t>
+              </a:r>
+              <a:endParaRPr lang="en-US" sz="3600" dirty="0" smtClean="0">
                 <a:solidFill>
                   <a:schemeClr val="bg1"/>
                 </a:solidFill>
                 <a:latin typeface="Helvetica Neue Thin" charset="0"/>
                 <a:ea typeface="Helvetica Neue Thin" charset="0"/>
                 <a:cs typeface="Helvetica Neue Thin" charset="0"/>
-              </a:rPr>
-              <a:t>m</a:t>
-            </a:r>
-            <a:r>
-              <a:rPr lang="en-US" sz="3600" dirty="0" err="1" smtClean="0">
-                <a:solidFill>
-                  <a:schemeClr val="bg1"/>
-                </a:solidFill>
-                <a:latin typeface="Helvetica Neue Thin" charset="0"/>
-                <a:ea typeface="Helvetica Neue Thin" charset="0"/>
-                <a:cs typeface="Helvetica Neue Thin" charset="0"/>
-              </a:rPr>
-              <a:t>oledcule</a:t>
-            </a:r>
-            <a:endParaRPr lang="en-US" sz="3600" dirty="0" smtClean="0">
-              <a:solidFill>
-                <a:schemeClr val="bg1"/>
-              </a:solidFill>
-              <a:latin typeface="Helvetica Neue Thin" charset="0"/>
-              <a:ea typeface="Helvetica Neue Thin" charset="0"/>
-              <a:cs typeface="Helvetica Neue Thin" charset="0"/>
-            </a:endParaRPr>
-          </a:p>
-          <a:p>
-            <a:r>
-              <a:rPr lang="en-US" sz="1600" dirty="0">
-                <a:solidFill>
-                  <a:schemeClr val="bg1"/>
-                </a:solidFill>
-                <a:latin typeface="Helvetica Neue" charset="0"/>
-                <a:ea typeface="Helvetica Neue" charset="0"/>
-                <a:cs typeface="Helvetica Neue" charset="0"/>
-              </a:rPr>
-              <a:t>your future friendly community based programmable led controller</a:t>
-            </a:r>
+              </a:endParaRPr>
+            </a:p>
+            <a:p>
+              <a:r>
+                <a:rPr lang="en-US" sz="1600" dirty="0">
+                  <a:solidFill>
+                    <a:schemeClr val="bg1"/>
+                  </a:solidFill>
+                  <a:latin typeface="Helvetica Neue" charset="0"/>
+                  <a:ea typeface="Helvetica Neue" charset="0"/>
+                  <a:cs typeface="Helvetica Neue" charset="0"/>
+                </a:rPr>
+                <a:t>your future friendly community based programmable led controller</a:t>
+              </a:r>
+            </a:p>
+          </p:txBody>
+        </p:sp>
+      </p:grpSp>
+      <p:sp>
+        <p:nvSpPr>
+          <p:cNvPr id="7" name="Rectangle 6"/>
+          <p:cNvSpPr/>
+          <p:nvPr/>
+        </p:nvSpPr>
+        <p:spPr>
+          <a:xfrm>
+            <a:off x="8595012" y="0"/>
+            <a:ext cx="3600000" cy="6858000"/>
+          </a:xfrm>
+          <a:prstGeom prst="rect">
+            <a:avLst/>
+          </a:prstGeom>
+          <a:solidFill>
+            <a:schemeClr val="bg1"/>
+          </a:solidFill>
+          <a:ln>
+            <a:noFill/>
+          </a:ln>
+        </p:spPr>
+        <p:style>
+          <a:lnRef idx="2">
+            <a:schemeClr val="accent1">
+              <a:shade val="50000"/>
+            </a:schemeClr>
+          </a:lnRef>
+          <a:fillRef idx="1">
+            <a:schemeClr val="accent1"/>
+          </a:fillRef>
+          <a:effectRef idx="0">
+            <a:schemeClr val="accent1"/>
+          </a:effectRef>
+          <a:fontRef idx="minor">
+            <a:schemeClr val="lt1"/>
+          </a:fontRef>
+        </p:style>
+        <p:txBody>
+          <a:bodyPr rtlCol="0" anchor="ctr"/>
+          <a:lstStyle/>
+          <a:p>
+            <a:pPr algn="ctr"/>
+            <a:endParaRPr lang="en-US"/>
           </a:p>
         </p:txBody>
       </p:sp>
@@ -3536,52 +3629,6 @@
           </a:p>
         </p:txBody>
       </p:sp>
-      <p:sp>
-        <p:nvSpPr>
-          <p:cNvPr id="7" name="Rectangle 6"/>
-          <p:cNvSpPr/>
-          <p:nvPr/>
-        </p:nvSpPr>
-        <p:spPr>
-          <a:xfrm>
-            <a:off x="8595012" y="0"/>
-            <a:ext cx="3600000" cy="6858000"/>
-          </a:xfrm>
-          <a:prstGeom prst="rect">
-            <a:avLst/>
-          </a:prstGeom>
-          <a:solidFill>
-            <a:schemeClr val="bg1"/>
-          </a:solidFill>
-          <a:ln>
-            <a:noFill/>
-          </a:ln>
-        </p:spPr>
-        <p:style>
-          <a:lnRef idx="2">
-            <a:schemeClr val="accent1">
-              <a:shade val="50000"/>
-            </a:schemeClr>
-          </a:lnRef>
-          <a:fillRef idx="1">
-            <a:schemeClr val="accent1"/>
-          </a:fillRef>
-          <a:effectRef idx="0">
-            <a:schemeClr val="accent1"/>
-          </a:effectRef>
-          <a:fontRef idx="minor">
-            <a:schemeClr val="lt1"/>
-          </a:fontRef>
-        </p:style>
-        <p:txBody>
-          <a:bodyPr rtlCol="0" anchor="ctr"/>
-          <a:lstStyle/>
-          <a:p>
-            <a:pPr algn="ctr"/>
-            <a:endParaRPr lang="en-US"/>
-          </a:p>
-        </p:txBody>
-      </p:sp>
       <p:grpSp>
         <p:nvGrpSpPr>
           <p:cNvPr id="10" name="Group 9"/>
@@ -3590,7 +3637,7 @@
         </p:nvGrpSpPr>
         <p:grpSpPr>
           <a:xfrm>
-            <a:off x="90000" y="666000"/>
+            <a:off x="90000" y="720000"/>
             <a:ext cx="2340000" cy="360000"/>
             <a:chOff x="90000" y="720000"/>
             <a:chExt cx="2340000" cy="540000"/>
@@ -3892,7 +3939,7 @@
                   <a:ea typeface="Helvetica Neue" charset="0"/>
                   <a:cs typeface="Helvetica Neue" charset="0"/>
                 </a:rPr>
-                <a:t>welcome</a:t>
+                <a:t>thanks</a:t>
               </a:r>
               <a:endParaRPr lang="en-US" sz="1200" dirty="0">
                 <a:solidFill>
@@ -3960,7 +4007,7 @@
                   <a:ea typeface="Helvetica Neue" charset="0"/>
                   <a:cs typeface="Helvetica Neue" charset="0"/>
                 </a:rPr>
-                <a:t>We</a:t>
+                <a:t>Ta</a:t>
               </a:r>
               <a:endParaRPr lang="en-US" sz="800" b="1" dirty="0">
                 <a:solidFill>
@@ -3984,7 +4031,7 @@
         </p:nvGrpSpPr>
         <p:grpSpPr>
           <a:xfrm>
-            <a:off x="90000" y="1152000"/>
+            <a:off x="90000" y="1260000"/>
             <a:ext cx="2340000" cy="360000"/>
             <a:chOff x="90000" y="720000"/>
             <a:chExt cx="2340000" cy="540000"/>
@@ -4137,7 +4184,7 @@
         </p:nvGrpSpPr>
         <p:grpSpPr>
           <a:xfrm>
-            <a:off x="89999" y="1638000"/>
+            <a:off x="90000" y="1800000"/>
             <a:ext cx="2340000" cy="360000"/>
             <a:chOff x="90000" y="720000"/>
             <a:chExt cx="2340000" cy="540000"/>
@@ -4282,6 +4329,950 @@
           </p:txBody>
         </p:sp>
       </p:grpSp>
+      <p:grpSp>
+        <p:nvGrpSpPr>
+          <p:cNvPr id="25" name="Group 24"/>
+          <p:cNvGrpSpPr/>
+          <p:nvPr/>
+        </p:nvGrpSpPr>
+        <p:grpSpPr>
+          <a:xfrm>
+            <a:off x="89999" y="2340000"/>
+            <a:ext cx="2340000" cy="360000"/>
+            <a:chOff x="90000" y="720000"/>
+            <a:chExt cx="2340000" cy="540000"/>
+          </a:xfrm>
+        </p:grpSpPr>
+        <p:sp>
+          <p:nvSpPr>
+            <p:cNvPr id="26" name="Rectangle 25"/>
+            <p:cNvSpPr/>
+            <p:nvPr/>
+          </p:nvSpPr>
+          <p:spPr>
+            <a:xfrm>
+              <a:off x="90000" y="720000"/>
+              <a:ext cx="2160000" cy="540000"/>
+            </a:xfrm>
+            <a:prstGeom prst="rect">
+              <a:avLst/>
+            </a:prstGeom>
+            <a:solidFill>
+              <a:schemeClr val="tx1">
+                <a:lumMod val="75000"/>
+                <a:lumOff val="25000"/>
+              </a:schemeClr>
+            </a:solidFill>
+            <a:ln>
+              <a:noFill/>
+            </a:ln>
+          </p:spPr>
+          <p:style>
+            <a:lnRef idx="2">
+              <a:schemeClr val="accent1">
+                <a:shade val="50000"/>
+              </a:schemeClr>
+            </a:lnRef>
+            <a:fillRef idx="1">
+              <a:schemeClr val="accent1"/>
+            </a:fillRef>
+            <a:effectRef idx="0">
+              <a:schemeClr val="accent1"/>
+            </a:effectRef>
+            <a:fontRef idx="minor">
+              <a:schemeClr val="lt1"/>
+            </a:fontRef>
+          </p:style>
+          <p:txBody>
+            <a:bodyPr rtlCol="0" anchor="ctr"/>
+            <a:lstStyle/>
+            <a:p>
+              <a:r>
+                <a:rPr lang="en-US" sz="1200" dirty="0">
+                  <a:solidFill>
+                    <a:schemeClr val="bg1">
+                      <a:lumMod val="50000"/>
+                    </a:schemeClr>
+                  </a:solidFill>
+                  <a:latin typeface="Helvetica Neue" charset="0"/>
+                  <a:ea typeface="Helvetica Neue" charset="0"/>
+                  <a:cs typeface="Helvetica Neue" charset="0"/>
+                </a:rPr>
+                <a:t>s</a:t>
+              </a:r>
+              <a:r>
+                <a:rPr lang="en-US" sz="1200" dirty="0" smtClean="0">
+                  <a:solidFill>
+                    <a:schemeClr val="bg1">
+                      <a:lumMod val="50000"/>
+                    </a:schemeClr>
+                  </a:solidFill>
+                  <a:latin typeface="Helvetica Neue" charset="0"/>
+                  <a:ea typeface="Helvetica Neue" charset="0"/>
+                  <a:cs typeface="Helvetica Neue" charset="0"/>
+                </a:rPr>
+                <a:t>parky </a:t>
+              </a:r>
+              <a:r>
+                <a:rPr lang="en-US" sz="1200" dirty="0" err="1" smtClean="0">
+                  <a:solidFill>
+                    <a:schemeClr val="bg1">
+                      <a:lumMod val="50000"/>
+                    </a:schemeClr>
+                  </a:solidFill>
+                  <a:latin typeface="Helvetica Neue" charset="0"/>
+                  <a:ea typeface="Helvetica Neue" charset="0"/>
+                  <a:cs typeface="Helvetica Neue" charset="0"/>
+                </a:rPr>
+                <a:t>jr.</a:t>
+              </a:r>
+              <a:endParaRPr lang="en-US" sz="1200" dirty="0">
+                <a:solidFill>
+                  <a:schemeClr val="bg1">
+                    <a:lumMod val="50000"/>
+                  </a:schemeClr>
+                </a:solidFill>
+              </a:endParaRPr>
+            </a:p>
+          </p:txBody>
+        </p:sp>
+        <p:sp>
+          <p:nvSpPr>
+            <p:cNvPr id="27" name="Rectangle 26"/>
+            <p:cNvSpPr/>
+            <p:nvPr/>
+          </p:nvSpPr>
+          <p:spPr>
+            <a:xfrm>
+              <a:off x="2070000" y="720000"/>
+              <a:ext cx="360000" cy="540000"/>
+            </a:xfrm>
+            <a:prstGeom prst="rect">
+              <a:avLst/>
+            </a:prstGeom>
+            <a:solidFill>
+              <a:schemeClr val="tx1">
+                <a:lumMod val="85000"/>
+                <a:lumOff val="15000"/>
+              </a:schemeClr>
+            </a:solidFill>
+            <a:ln>
+              <a:noFill/>
+            </a:ln>
+          </p:spPr>
+          <p:style>
+            <a:lnRef idx="2">
+              <a:schemeClr val="accent1">
+                <a:shade val="50000"/>
+              </a:schemeClr>
+            </a:lnRef>
+            <a:fillRef idx="1">
+              <a:schemeClr val="accent1"/>
+            </a:fillRef>
+            <a:effectRef idx="0">
+              <a:schemeClr val="accent1"/>
+            </a:effectRef>
+            <a:fontRef idx="minor">
+              <a:schemeClr val="lt1"/>
+            </a:fontRef>
+          </p:style>
+          <p:txBody>
+            <a:bodyPr rtlCol="0" anchor="ctr"/>
+            <a:lstStyle/>
+            <a:p>
+              <a:pPr algn="ctr"/>
+              <a:r>
+                <a:rPr lang="en-US" sz="800" b="1" dirty="0" err="1" smtClean="0">
+                  <a:solidFill>
+                    <a:schemeClr val="bg1">
+                      <a:lumMod val="50000"/>
+                    </a:schemeClr>
+                  </a:solidFill>
+                  <a:latin typeface="Helvetica Neue" charset="0"/>
+                  <a:ea typeface="Helvetica Neue" charset="0"/>
+                  <a:cs typeface="Helvetica Neue" charset="0"/>
+                </a:rPr>
+                <a:t>Sp</a:t>
+              </a:r>
+              <a:endParaRPr lang="en-US" sz="800" b="1" dirty="0">
+                <a:solidFill>
+                  <a:schemeClr val="bg1">
+                    <a:lumMod val="50000"/>
+                  </a:schemeClr>
+                </a:solidFill>
+                <a:latin typeface="Helvetica Neue" charset="0"/>
+                <a:ea typeface="Helvetica Neue" charset="0"/>
+                <a:cs typeface="Helvetica Neue" charset="0"/>
+              </a:endParaRPr>
+            </a:p>
+          </p:txBody>
+        </p:sp>
+      </p:grpSp>
+      <p:grpSp>
+        <p:nvGrpSpPr>
+          <p:cNvPr id="28" name="Group 27"/>
+          <p:cNvGrpSpPr/>
+          <p:nvPr/>
+        </p:nvGrpSpPr>
+        <p:grpSpPr>
+          <a:xfrm>
+            <a:off x="89999" y="2880000"/>
+            <a:ext cx="2340000" cy="360000"/>
+            <a:chOff x="90000" y="720000"/>
+            <a:chExt cx="2340000" cy="540000"/>
+          </a:xfrm>
+        </p:grpSpPr>
+        <p:sp>
+          <p:nvSpPr>
+            <p:cNvPr id="29" name="Rectangle 28"/>
+            <p:cNvSpPr/>
+            <p:nvPr/>
+          </p:nvSpPr>
+          <p:spPr>
+            <a:xfrm>
+              <a:off x="90000" y="720000"/>
+              <a:ext cx="2160000" cy="540000"/>
+            </a:xfrm>
+            <a:prstGeom prst="rect">
+              <a:avLst/>
+            </a:prstGeom>
+            <a:solidFill>
+              <a:schemeClr val="tx1">
+                <a:lumMod val="75000"/>
+                <a:lumOff val="25000"/>
+              </a:schemeClr>
+            </a:solidFill>
+            <a:ln>
+              <a:noFill/>
+            </a:ln>
+          </p:spPr>
+          <p:style>
+            <a:lnRef idx="2">
+              <a:schemeClr val="accent1">
+                <a:shade val="50000"/>
+              </a:schemeClr>
+            </a:lnRef>
+            <a:fillRef idx="1">
+              <a:schemeClr val="accent1"/>
+            </a:fillRef>
+            <a:effectRef idx="0">
+              <a:schemeClr val="accent1"/>
+            </a:effectRef>
+            <a:fontRef idx="minor">
+              <a:schemeClr val="lt1"/>
+            </a:fontRef>
+          </p:style>
+          <p:txBody>
+            <a:bodyPr rtlCol="0" anchor="ctr"/>
+            <a:lstStyle/>
+            <a:p>
+              <a:r>
+                <a:rPr lang="en-US" sz="1200" dirty="0" err="1" smtClean="0">
+                  <a:solidFill>
+                    <a:schemeClr val="bg1">
+                      <a:lumMod val="50000"/>
+                    </a:schemeClr>
+                  </a:solidFill>
+                  <a:latin typeface="Helvetica Neue" charset="0"/>
+                  <a:ea typeface="Helvetica Neue" charset="0"/>
+                  <a:cs typeface="Helvetica Neue" charset="0"/>
+                </a:rPr>
+                <a:t>kaimana</a:t>
+              </a:r>
+              <a:endParaRPr lang="en-US" sz="1200" dirty="0">
+                <a:solidFill>
+                  <a:schemeClr val="bg1">
+                    <a:lumMod val="50000"/>
+                  </a:schemeClr>
+                </a:solidFill>
+              </a:endParaRPr>
+            </a:p>
+          </p:txBody>
+        </p:sp>
+        <p:sp>
+          <p:nvSpPr>
+            <p:cNvPr id="30" name="Rectangle 29"/>
+            <p:cNvSpPr/>
+            <p:nvPr/>
+          </p:nvSpPr>
+          <p:spPr>
+            <a:xfrm>
+              <a:off x="2070000" y="720000"/>
+              <a:ext cx="360000" cy="540000"/>
+            </a:xfrm>
+            <a:prstGeom prst="rect">
+              <a:avLst/>
+            </a:prstGeom>
+            <a:solidFill>
+              <a:schemeClr val="tx1">
+                <a:lumMod val="85000"/>
+                <a:lumOff val="15000"/>
+              </a:schemeClr>
+            </a:solidFill>
+            <a:ln>
+              <a:noFill/>
+            </a:ln>
+          </p:spPr>
+          <p:style>
+            <a:lnRef idx="2">
+              <a:schemeClr val="accent1">
+                <a:shade val="50000"/>
+              </a:schemeClr>
+            </a:lnRef>
+            <a:fillRef idx="1">
+              <a:schemeClr val="accent1"/>
+            </a:fillRef>
+            <a:effectRef idx="0">
+              <a:schemeClr val="accent1"/>
+            </a:effectRef>
+            <a:fontRef idx="minor">
+              <a:schemeClr val="lt1"/>
+            </a:fontRef>
+          </p:style>
+          <p:txBody>
+            <a:bodyPr rtlCol="0" anchor="ctr"/>
+            <a:lstStyle/>
+            <a:p>
+              <a:pPr algn="ctr"/>
+              <a:r>
+                <a:rPr lang="en-US" sz="800" b="1" dirty="0" err="1" smtClean="0">
+                  <a:solidFill>
+                    <a:schemeClr val="bg1">
+                      <a:lumMod val="50000"/>
+                    </a:schemeClr>
+                  </a:solidFill>
+                  <a:latin typeface="Helvetica Neue" charset="0"/>
+                  <a:ea typeface="Helvetica Neue" charset="0"/>
+                  <a:cs typeface="Helvetica Neue" charset="0"/>
+                </a:rPr>
+                <a:t>Ka</a:t>
+              </a:r>
+              <a:endParaRPr lang="en-US" sz="800" b="1" dirty="0">
+                <a:solidFill>
+                  <a:schemeClr val="bg1">
+                    <a:lumMod val="50000"/>
+                  </a:schemeClr>
+                </a:solidFill>
+                <a:latin typeface="Helvetica Neue" charset="0"/>
+                <a:ea typeface="Helvetica Neue" charset="0"/>
+                <a:cs typeface="Helvetica Neue" charset="0"/>
+              </a:endParaRPr>
+            </a:p>
+          </p:txBody>
+        </p:sp>
+      </p:grpSp>
+      <p:grpSp>
+        <p:nvGrpSpPr>
+          <p:cNvPr id="31" name="Group 30"/>
+          <p:cNvGrpSpPr/>
+          <p:nvPr/>
+        </p:nvGrpSpPr>
+        <p:grpSpPr>
+          <a:xfrm>
+            <a:off x="90000" y="3420000"/>
+            <a:ext cx="2340000" cy="360000"/>
+            <a:chOff x="90000" y="720000"/>
+            <a:chExt cx="2340000" cy="540000"/>
+          </a:xfrm>
+        </p:grpSpPr>
+        <p:sp>
+          <p:nvSpPr>
+            <p:cNvPr id="32" name="Rectangle 31"/>
+            <p:cNvSpPr/>
+            <p:nvPr/>
+          </p:nvSpPr>
+          <p:spPr>
+            <a:xfrm>
+              <a:off x="90000" y="720000"/>
+              <a:ext cx="2160000" cy="540000"/>
+            </a:xfrm>
+            <a:prstGeom prst="rect">
+              <a:avLst/>
+            </a:prstGeom>
+            <a:solidFill>
+              <a:schemeClr val="tx1">
+                <a:lumMod val="75000"/>
+                <a:lumOff val="25000"/>
+              </a:schemeClr>
+            </a:solidFill>
+            <a:ln>
+              <a:noFill/>
+            </a:ln>
+          </p:spPr>
+          <p:style>
+            <a:lnRef idx="2">
+              <a:schemeClr val="accent1">
+                <a:shade val="50000"/>
+              </a:schemeClr>
+            </a:lnRef>
+            <a:fillRef idx="1">
+              <a:schemeClr val="accent1"/>
+            </a:fillRef>
+            <a:effectRef idx="0">
+              <a:schemeClr val="accent1"/>
+            </a:effectRef>
+            <a:fontRef idx="minor">
+              <a:schemeClr val="lt1"/>
+            </a:fontRef>
+          </p:style>
+          <p:txBody>
+            <a:bodyPr rtlCol="0" anchor="ctr"/>
+            <a:lstStyle/>
+            <a:p>
+              <a:r>
+                <a:rPr lang="en-US" sz="1200" dirty="0" smtClean="0">
+                  <a:solidFill>
+                    <a:schemeClr val="bg1">
+                      <a:lumMod val="50000"/>
+                    </a:schemeClr>
+                  </a:solidFill>
+                  <a:latin typeface="Helvetica Neue" charset="0"/>
+                  <a:ea typeface="Helvetica Neue" charset="0"/>
+                  <a:cs typeface="Helvetica Neue" charset="0"/>
+                </a:rPr>
+                <a:t>opportunity</a:t>
+              </a:r>
+              <a:endParaRPr lang="en-US" sz="1200" dirty="0">
+                <a:solidFill>
+                  <a:schemeClr val="bg1">
+                    <a:lumMod val="50000"/>
+                  </a:schemeClr>
+                </a:solidFill>
+              </a:endParaRPr>
+            </a:p>
+          </p:txBody>
+        </p:sp>
+        <p:sp>
+          <p:nvSpPr>
+            <p:cNvPr id="33" name="Rectangle 32"/>
+            <p:cNvSpPr/>
+            <p:nvPr/>
+          </p:nvSpPr>
+          <p:spPr>
+            <a:xfrm>
+              <a:off x="2070000" y="720000"/>
+              <a:ext cx="360000" cy="540000"/>
+            </a:xfrm>
+            <a:prstGeom prst="rect">
+              <a:avLst/>
+            </a:prstGeom>
+            <a:solidFill>
+              <a:schemeClr val="tx1">
+                <a:lumMod val="85000"/>
+                <a:lumOff val="15000"/>
+              </a:schemeClr>
+            </a:solidFill>
+            <a:ln>
+              <a:noFill/>
+            </a:ln>
+          </p:spPr>
+          <p:style>
+            <a:lnRef idx="2">
+              <a:schemeClr val="accent1">
+                <a:shade val="50000"/>
+              </a:schemeClr>
+            </a:lnRef>
+            <a:fillRef idx="1">
+              <a:schemeClr val="accent1"/>
+            </a:fillRef>
+            <a:effectRef idx="0">
+              <a:schemeClr val="accent1"/>
+            </a:effectRef>
+            <a:fontRef idx="minor">
+              <a:schemeClr val="lt1"/>
+            </a:fontRef>
+          </p:style>
+          <p:txBody>
+            <a:bodyPr rtlCol="0" anchor="ctr"/>
+            <a:lstStyle/>
+            <a:p>
+              <a:pPr algn="ctr"/>
+              <a:r>
+                <a:rPr lang="en-US" sz="800" b="1" dirty="0" smtClean="0">
+                  <a:solidFill>
+                    <a:schemeClr val="bg1">
+                      <a:lumMod val="50000"/>
+                    </a:schemeClr>
+                  </a:solidFill>
+                  <a:latin typeface="Helvetica Neue" charset="0"/>
+                  <a:ea typeface="Helvetica Neue" charset="0"/>
+                  <a:cs typeface="Helvetica Neue" charset="0"/>
+                </a:rPr>
+                <a:t>Op</a:t>
+              </a:r>
+              <a:endParaRPr lang="en-US" sz="800" b="1" dirty="0">
+                <a:solidFill>
+                  <a:schemeClr val="bg1">
+                    <a:lumMod val="50000"/>
+                  </a:schemeClr>
+                </a:solidFill>
+                <a:latin typeface="Helvetica Neue" charset="0"/>
+                <a:ea typeface="Helvetica Neue" charset="0"/>
+                <a:cs typeface="Helvetica Neue" charset="0"/>
+              </a:endParaRPr>
+            </a:p>
+          </p:txBody>
+        </p:sp>
+      </p:grpSp>
+      <p:grpSp>
+        <p:nvGrpSpPr>
+          <p:cNvPr id="34" name="Group 33"/>
+          <p:cNvGrpSpPr/>
+          <p:nvPr/>
+        </p:nvGrpSpPr>
+        <p:grpSpPr>
+          <a:xfrm>
+            <a:off x="89999" y="3960000"/>
+            <a:ext cx="2340000" cy="360000"/>
+            <a:chOff x="90000" y="720000"/>
+            <a:chExt cx="2340000" cy="540000"/>
+          </a:xfrm>
+        </p:grpSpPr>
+        <p:sp>
+          <p:nvSpPr>
+            <p:cNvPr id="35" name="Rectangle 34"/>
+            <p:cNvSpPr/>
+            <p:nvPr/>
+          </p:nvSpPr>
+          <p:spPr>
+            <a:xfrm>
+              <a:off x="90000" y="720000"/>
+              <a:ext cx="2160000" cy="540000"/>
+            </a:xfrm>
+            <a:prstGeom prst="rect">
+              <a:avLst/>
+            </a:prstGeom>
+            <a:solidFill>
+              <a:schemeClr val="tx1">
+                <a:lumMod val="75000"/>
+                <a:lumOff val="25000"/>
+              </a:schemeClr>
+            </a:solidFill>
+            <a:ln>
+              <a:noFill/>
+            </a:ln>
+          </p:spPr>
+          <p:style>
+            <a:lnRef idx="2">
+              <a:schemeClr val="accent1">
+                <a:shade val="50000"/>
+              </a:schemeClr>
+            </a:lnRef>
+            <a:fillRef idx="1">
+              <a:schemeClr val="accent1"/>
+            </a:fillRef>
+            <a:effectRef idx="0">
+              <a:schemeClr val="accent1"/>
+            </a:effectRef>
+            <a:fontRef idx="minor">
+              <a:schemeClr val="lt1"/>
+            </a:fontRef>
+          </p:style>
+          <p:txBody>
+            <a:bodyPr rtlCol="0" anchor="ctr"/>
+            <a:lstStyle/>
+            <a:p>
+              <a:r>
+                <a:rPr lang="en-US" sz="1200" dirty="0" err="1" smtClean="0">
+                  <a:solidFill>
+                    <a:schemeClr val="bg1">
+                      <a:lumMod val="50000"/>
+                    </a:schemeClr>
+                  </a:solidFill>
+                  <a:latin typeface="Helvetica Neue" charset="0"/>
+                  <a:ea typeface="Helvetica Neue" charset="0"/>
+                  <a:cs typeface="Helvetica Neue" charset="0"/>
+                </a:rPr>
+                <a:t>moledcule</a:t>
+              </a:r>
+              <a:endParaRPr lang="en-US" sz="1200" dirty="0">
+                <a:solidFill>
+                  <a:schemeClr val="bg1">
+                    <a:lumMod val="50000"/>
+                  </a:schemeClr>
+                </a:solidFill>
+              </a:endParaRPr>
+            </a:p>
+          </p:txBody>
+        </p:sp>
+        <p:sp>
+          <p:nvSpPr>
+            <p:cNvPr id="36" name="Rectangle 35"/>
+            <p:cNvSpPr/>
+            <p:nvPr/>
+          </p:nvSpPr>
+          <p:spPr>
+            <a:xfrm>
+              <a:off x="2070000" y="720000"/>
+              <a:ext cx="360000" cy="540000"/>
+            </a:xfrm>
+            <a:prstGeom prst="rect">
+              <a:avLst/>
+            </a:prstGeom>
+            <a:solidFill>
+              <a:schemeClr val="tx1">
+                <a:lumMod val="85000"/>
+                <a:lumOff val="15000"/>
+              </a:schemeClr>
+            </a:solidFill>
+            <a:ln>
+              <a:noFill/>
+            </a:ln>
+          </p:spPr>
+          <p:style>
+            <a:lnRef idx="2">
+              <a:schemeClr val="accent1">
+                <a:shade val="50000"/>
+              </a:schemeClr>
+            </a:lnRef>
+            <a:fillRef idx="1">
+              <a:schemeClr val="accent1"/>
+            </a:fillRef>
+            <a:effectRef idx="0">
+              <a:schemeClr val="accent1"/>
+            </a:effectRef>
+            <a:fontRef idx="minor">
+              <a:schemeClr val="lt1"/>
+            </a:fontRef>
+          </p:style>
+          <p:txBody>
+            <a:bodyPr rtlCol="0" anchor="ctr"/>
+            <a:lstStyle/>
+            <a:p>
+              <a:pPr algn="ctr"/>
+              <a:r>
+                <a:rPr lang="en-US" sz="800" b="1" dirty="0" smtClean="0">
+                  <a:solidFill>
+                    <a:schemeClr val="bg1">
+                      <a:lumMod val="50000"/>
+                    </a:schemeClr>
+                  </a:solidFill>
+                  <a:latin typeface="Helvetica Neue" charset="0"/>
+                  <a:ea typeface="Helvetica Neue" charset="0"/>
+                  <a:cs typeface="Helvetica Neue" charset="0"/>
+                </a:rPr>
+                <a:t>Mo</a:t>
+              </a:r>
+              <a:endParaRPr lang="en-US" sz="800" b="1" dirty="0">
+                <a:solidFill>
+                  <a:schemeClr val="bg1">
+                    <a:lumMod val="50000"/>
+                  </a:schemeClr>
+                </a:solidFill>
+                <a:latin typeface="Helvetica Neue" charset="0"/>
+                <a:ea typeface="Helvetica Neue" charset="0"/>
+                <a:cs typeface="Helvetica Neue" charset="0"/>
+              </a:endParaRPr>
+            </a:p>
+          </p:txBody>
+        </p:sp>
+      </p:grpSp>
+      <p:grpSp>
+        <p:nvGrpSpPr>
+          <p:cNvPr id="37" name="Group 36"/>
+          <p:cNvGrpSpPr/>
+          <p:nvPr/>
+        </p:nvGrpSpPr>
+        <p:grpSpPr>
+          <a:xfrm>
+            <a:off x="90000" y="4500000"/>
+            <a:ext cx="2340000" cy="360000"/>
+            <a:chOff x="90000" y="720000"/>
+            <a:chExt cx="2340000" cy="540000"/>
+          </a:xfrm>
+        </p:grpSpPr>
+        <p:sp>
+          <p:nvSpPr>
+            <p:cNvPr id="38" name="Rectangle 37"/>
+            <p:cNvSpPr/>
+            <p:nvPr/>
+          </p:nvSpPr>
+          <p:spPr>
+            <a:xfrm>
+              <a:off x="90000" y="720000"/>
+              <a:ext cx="2160000" cy="540000"/>
+            </a:xfrm>
+            <a:prstGeom prst="rect">
+              <a:avLst/>
+            </a:prstGeom>
+            <a:solidFill>
+              <a:schemeClr val="tx1">
+                <a:lumMod val="75000"/>
+                <a:lumOff val="25000"/>
+              </a:schemeClr>
+            </a:solidFill>
+            <a:ln>
+              <a:noFill/>
+            </a:ln>
+          </p:spPr>
+          <p:style>
+            <a:lnRef idx="2">
+              <a:schemeClr val="accent1">
+                <a:shade val="50000"/>
+              </a:schemeClr>
+            </a:lnRef>
+            <a:fillRef idx="1">
+              <a:schemeClr val="accent1"/>
+            </a:fillRef>
+            <a:effectRef idx="0">
+              <a:schemeClr val="accent1"/>
+            </a:effectRef>
+            <a:fontRef idx="minor">
+              <a:schemeClr val="lt1"/>
+            </a:fontRef>
+          </p:style>
+          <p:txBody>
+            <a:bodyPr rtlCol="0" anchor="ctr"/>
+            <a:lstStyle/>
+            <a:p>
+              <a:r>
+                <a:rPr lang="en-US" sz="1200" dirty="0" smtClean="0">
+                  <a:solidFill>
+                    <a:schemeClr val="bg1">
+                      <a:lumMod val="50000"/>
+                    </a:schemeClr>
+                  </a:solidFill>
+                  <a:latin typeface="Helvetica Neue" charset="0"/>
+                  <a:ea typeface="Helvetica Neue" charset="0"/>
+                  <a:cs typeface="Helvetica Neue" charset="0"/>
+                </a:rPr>
+                <a:t>demo</a:t>
+              </a:r>
+              <a:endParaRPr lang="en-US" sz="1200" dirty="0">
+                <a:solidFill>
+                  <a:schemeClr val="bg1">
+                    <a:lumMod val="50000"/>
+                  </a:schemeClr>
+                </a:solidFill>
+              </a:endParaRPr>
+            </a:p>
+          </p:txBody>
+        </p:sp>
+        <p:sp>
+          <p:nvSpPr>
+            <p:cNvPr id="39" name="Rectangle 38"/>
+            <p:cNvSpPr/>
+            <p:nvPr/>
+          </p:nvSpPr>
+          <p:spPr>
+            <a:xfrm>
+              <a:off x="2070000" y="720000"/>
+              <a:ext cx="360000" cy="540000"/>
+            </a:xfrm>
+            <a:prstGeom prst="rect">
+              <a:avLst/>
+            </a:prstGeom>
+            <a:solidFill>
+              <a:schemeClr val="tx1">
+                <a:lumMod val="85000"/>
+                <a:lumOff val="15000"/>
+              </a:schemeClr>
+            </a:solidFill>
+            <a:ln>
+              <a:noFill/>
+            </a:ln>
+          </p:spPr>
+          <p:style>
+            <a:lnRef idx="2">
+              <a:schemeClr val="accent1">
+                <a:shade val="50000"/>
+              </a:schemeClr>
+            </a:lnRef>
+            <a:fillRef idx="1">
+              <a:schemeClr val="accent1"/>
+            </a:fillRef>
+            <a:effectRef idx="0">
+              <a:schemeClr val="accent1"/>
+            </a:effectRef>
+            <a:fontRef idx="minor">
+              <a:schemeClr val="lt1"/>
+            </a:fontRef>
+          </p:style>
+          <p:txBody>
+            <a:bodyPr rtlCol="0" anchor="ctr"/>
+            <a:lstStyle/>
+            <a:p>
+              <a:pPr algn="ctr"/>
+              <a:r>
+                <a:rPr lang="en-US" sz="800" b="1" dirty="0" smtClean="0">
+                  <a:solidFill>
+                    <a:schemeClr val="bg1">
+                      <a:lumMod val="50000"/>
+                    </a:schemeClr>
+                  </a:solidFill>
+                  <a:latin typeface="Helvetica Neue" charset="0"/>
+                  <a:ea typeface="Helvetica Neue" charset="0"/>
+                  <a:cs typeface="Helvetica Neue" charset="0"/>
+                </a:rPr>
+                <a:t>De</a:t>
+              </a:r>
+              <a:endParaRPr lang="en-US" sz="800" b="1" dirty="0">
+                <a:solidFill>
+                  <a:schemeClr val="bg1">
+                    <a:lumMod val="50000"/>
+                  </a:schemeClr>
+                </a:solidFill>
+                <a:latin typeface="Helvetica Neue" charset="0"/>
+                <a:ea typeface="Helvetica Neue" charset="0"/>
+                <a:cs typeface="Helvetica Neue" charset="0"/>
+              </a:endParaRPr>
+            </a:p>
+          </p:txBody>
+        </p:sp>
+      </p:grpSp>
+      <p:grpSp>
+        <p:nvGrpSpPr>
+          <p:cNvPr id="40" name="Group 39"/>
+          <p:cNvGrpSpPr/>
+          <p:nvPr/>
+        </p:nvGrpSpPr>
+        <p:grpSpPr>
+          <a:xfrm>
+            <a:off x="89999" y="5040000"/>
+            <a:ext cx="2340000" cy="360000"/>
+            <a:chOff x="90000" y="720000"/>
+            <a:chExt cx="2340000" cy="540000"/>
+          </a:xfrm>
+        </p:grpSpPr>
+        <p:sp>
+          <p:nvSpPr>
+            <p:cNvPr id="41" name="Rectangle 40"/>
+            <p:cNvSpPr/>
+            <p:nvPr/>
+          </p:nvSpPr>
+          <p:spPr>
+            <a:xfrm>
+              <a:off x="90000" y="720000"/>
+              <a:ext cx="2160000" cy="540000"/>
+            </a:xfrm>
+            <a:prstGeom prst="rect">
+              <a:avLst/>
+            </a:prstGeom>
+            <a:solidFill>
+              <a:schemeClr val="tx1">
+                <a:lumMod val="75000"/>
+                <a:lumOff val="25000"/>
+              </a:schemeClr>
+            </a:solidFill>
+            <a:ln>
+              <a:noFill/>
+            </a:ln>
+          </p:spPr>
+          <p:style>
+            <a:lnRef idx="2">
+              <a:schemeClr val="accent1">
+                <a:shade val="50000"/>
+              </a:schemeClr>
+            </a:lnRef>
+            <a:fillRef idx="1">
+              <a:schemeClr val="accent1"/>
+            </a:fillRef>
+            <a:effectRef idx="0">
+              <a:schemeClr val="accent1"/>
+            </a:effectRef>
+            <a:fontRef idx="minor">
+              <a:schemeClr val="lt1"/>
+            </a:fontRef>
+          </p:style>
+          <p:txBody>
+            <a:bodyPr rtlCol="0" anchor="ctr"/>
+            <a:lstStyle/>
+            <a:p>
+              <a:r>
+                <a:rPr lang="en-US" sz="1200" dirty="0" smtClean="0">
+                  <a:solidFill>
+                    <a:schemeClr val="bg1">
+                      <a:lumMod val="50000"/>
+                    </a:schemeClr>
+                  </a:solidFill>
+                  <a:latin typeface="Helvetica Neue" charset="0"/>
+                  <a:ea typeface="Helvetica Neue" charset="0"/>
+                  <a:cs typeface="Helvetica Neue" charset="0"/>
+                </a:rPr>
+                <a:t>compiler</a:t>
+              </a:r>
+              <a:endParaRPr lang="en-US" sz="1200" dirty="0">
+                <a:solidFill>
+                  <a:schemeClr val="bg1">
+                    <a:lumMod val="50000"/>
+                  </a:schemeClr>
+                </a:solidFill>
+              </a:endParaRPr>
+            </a:p>
+          </p:txBody>
+        </p:sp>
+        <p:sp>
+          <p:nvSpPr>
+            <p:cNvPr id="42" name="Rectangle 41"/>
+            <p:cNvSpPr/>
+            <p:nvPr/>
+          </p:nvSpPr>
+          <p:spPr>
+            <a:xfrm>
+              <a:off x="2070000" y="720000"/>
+              <a:ext cx="360000" cy="540000"/>
+            </a:xfrm>
+            <a:prstGeom prst="rect">
+              <a:avLst/>
+            </a:prstGeom>
+            <a:solidFill>
+              <a:schemeClr val="tx1">
+                <a:lumMod val="85000"/>
+                <a:lumOff val="15000"/>
+              </a:schemeClr>
+            </a:solidFill>
+            <a:ln>
+              <a:noFill/>
+            </a:ln>
+          </p:spPr>
+          <p:style>
+            <a:lnRef idx="2">
+              <a:schemeClr val="accent1">
+                <a:shade val="50000"/>
+              </a:schemeClr>
+            </a:lnRef>
+            <a:fillRef idx="1">
+              <a:schemeClr val="accent1"/>
+            </a:fillRef>
+            <a:effectRef idx="0">
+              <a:schemeClr val="accent1"/>
+            </a:effectRef>
+            <a:fontRef idx="minor">
+              <a:schemeClr val="lt1"/>
+            </a:fontRef>
+          </p:style>
+          <p:txBody>
+            <a:bodyPr rtlCol="0" anchor="ctr"/>
+            <a:lstStyle/>
+            <a:p>
+              <a:pPr algn="ctr"/>
+              <a:r>
+                <a:rPr lang="en-US" sz="800" b="1" dirty="0" smtClean="0">
+                  <a:solidFill>
+                    <a:schemeClr val="bg1">
+                      <a:lumMod val="50000"/>
+                    </a:schemeClr>
+                  </a:solidFill>
+                  <a:latin typeface="Helvetica Neue" charset="0"/>
+                  <a:ea typeface="Helvetica Neue" charset="0"/>
+                  <a:cs typeface="Helvetica Neue" charset="0"/>
+                </a:rPr>
+                <a:t>Co</a:t>
+              </a:r>
+              <a:endParaRPr lang="en-US" sz="800" b="1" dirty="0">
+                <a:solidFill>
+                  <a:schemeClr val="bg1">
+                    <a:lumMod val="50000"/>
+                  </a:schemeClr>
+                </a:solidFill>
+                <a:latin typeface="Helvetica Neue" charset="0"/>
+                <a:ea typeface="Helvetica Neue" charset="0"/>
+                <a:cs typeface="Helvetica Neue" charset="0"/>
+              </a:endParaRPr>
+            </a:p>
+          </p:txBody>
+        </p:sp>
+      </p:grpSp>
     </p:spTree>
     <p:extLst>
       <p:ext uri="{BB962C8B-B14F-4D97-AF65-F5344CB8AC3E}">
@@ -4292,6 +5283,18 @@
   <p:clrMapOvr>
     <a:masterClrMapping/>
   </p:clrMapOvr>
+  <mc:AlternateContent xmlns:mc="http://schemas.openxmlformats.org/markup-compatibility/2006">
+    <mc:Choice xmlns:p14="http://schemas.microsoft.com/office/powerpoint/2010/main" Requires="p14">
+      <p:transition spd="slow" p14:dur="4000">
+        <p14:vortex dir="r"/>
+      </p:transition>
+    </mc:Choice>
+    <mc:Fallback>
+      <p:transition spd="slow">
+        <p:fade/>
+      </p:transition>
+    </mc:Fallback>
+  </mc:AlternateContent>
   <p:timing>
     <p:tnLst>
       <p:par>

</xml_diff>